<commit_message>
Update Labaratoriya 4 və 5 web.pptx
</commit_message>
<xml_diff>
--- a/Labaratoriya 4 və 5 web.pptx
+++ b/Labaratoriya 4 və 5 web.pptx
@@ -13,30 +13,32 @@
     <p:sldId id="261" r:id="rId7"/>
     <p:sldId id="262" r:id="rId8"/>
     <p:sldId id="263" r:id="rId9"/>
-    <p:sldId id="264" r:id="rId10"/>
-    <p:sldId id="265" r:id="rId11"/>
+    <p:sldId id="266" r:id="rId10"/>
+    <p:sldId id="267" r:id="rId11"/>
+    <p:sldId id="264" r:id="rId12"/>
+    <p:sldId id="265" r:id="rId13"/>
   </p:sldIdLst>
   <p:sldSz cx="18288000" cy="10287000"/>
   <p:notesSz cx="6858000" cy="9144000"/>
   <p:embeddedFontLst>
     <p:embeddedFont>
       <p:font typeface="Calibri" panose="020F0502020204030204" pitchFamily="34" charset="0"/>
-      <p:regular r:id="rId12"/>
-      <p:bold r:id="rId13"/>
-      <p:italic r:id="rId14"/>
-      <p:boldItalic r:id="rId15"/>
+      <p:regular r:id="rId14"/>
+      <p:bold r:id="rId15"/>
+      <p:italic r:id="rId16"/>
+      <p:boldItalic r:id="rId17"/>
     </p:embeddedFont>
     <p:embeddedFont>
       <p:font typeface="Cooper Hewitt" panose="020B0604020202020204" charset="0"/>
-      <p:regular r:id="rId16"/>
+      <p:regular r:id="rId18"/>
     </p:embeddedFont>
     <p:embeddedFont>
       <p:font typeface="Roboto" panose="02000000000000000000" pitchFamily="2" charset="0"/>
-      <p:regular r:id="rId17"/>
+      <p:regular r:id="rId19"/>
     </p:embeddedFont>
     <p:embeddedFont>
       <p:font typeface="Roboto Bold" panose="02000000000000000000" charset="0"/>
-      <p:regular r:id="rId18"/>
+      <p:regular r:id="rId20"/>
     </p:embeddedFont>
   </p:embeddedFontLst>
   <p:defaultTextStyle>
@@ -333,7 +335,7 @@
             <a:fld id="{1D8BD707-D9CF-40AE-B4C6-C98DA3205C09}" type="datetimeFigureOut">
               <a:rPr lang="en-US" smtClean="0"/>
               <a:pPr/>
-              <a:t>10/29/2022</a:t>
+              <a:t>10/31/2022</a:t>
             </a:fld>
             <a:endParaRPr lang="en-US" dirty="0"/>
           </a:p>
@@ -498,7 +500,7 @@
             <a:fld id="{1D8BD707-D9CF-40AE-B4C6-C98DA3205C09}" type="datetimeFigureOut">
               <a:rPr lang="en-US" smtClean="0"/>
               <a:pPr/>
-              <a:t>10/29/2022</a:t>
+              <a:t>10/31/2022</a:t>
             </a:fld>
             <a:endParaRPr lang="en-US" dirty="0"/>
           </a:p>
@@ -673,7 +675,7 @@
             <a:fld id="{1D8BD707-D9CF-40AE-B4C6-C98DA3205C09}" type="datetimeFigureOut">
               <a:rPr lang="en-US" smtClean="0"/>
               <a:pPr/>
-              <a:t>10/29/2022</a:t>
+              <a:t>10/31/2022</a:t>
             </a:fld>
             <a:endParaRPr lang="en-US" dirty="0"/>
           </a:p>
@@ -838,7 +840,7 @@
             <a:fld id="{1D8BD707-D9CF-40AE-B4C6-C98DA3205C09}" type="datetimeFigureOut">
               <a:rPr lang="en-US" smtClean="0"/>
               <a:pPr/>
-              <a:t>10/29/2022</a:t>
+              <a:t>10/31/2022</a:t>
             </a:fld>
             <a:endParaRPr lang="en-US" dirty="0"/>
           </a:p>
@@ -1080,7 +1082,7 @@
             <a:fld id="{1D8BD707-D9CF-40AE-B4C6-C98DA3205C09}" type="datetimeFigureOut">
               <a:rPr lang="en-US" smtClean="0"/>
               <a:pPr/>
-              <a:t>10/29/2022</a:t>
+              <a:t>10/31/2022</a:t>
             </a:fld>
             <a:endParaRPr lang="en-US" dirty="0"/>
           </a:p>
@@ -1362,7 +1364,7 @@
             <a:fld id="{1D8BD707-D9CF-40AE-B4C6-C98DA3205C09}" type="datetimeFigureOut">
               <a:rPr lang="en-US" smtClean="0"/>
               <a:pPr/>
-              <a:t>10/29/2022</a:t>
+              <a:t>10/31/2022</a:t>
             </a:fld>
             <a:endParaRPr lang="en-US" dirty="0"/>
           </a:p>
@@ -1778,7 +1780,7 @@
             <a:fld id="{1D8BD707-D9CF-40AE-B4C6-C98DA3205C09}" type="datetimeFigureOut">
               <a:rPr lang="en-US" smtClean="0"/>
               <a:pPr/>
-              <a:t>10/29/2022</a:t>
+              <a:t>10/31/2022</a:t>
             </a:fld>
             <a:endParaRPr lang="en-US" dirty="0"/>
           </a:p>
@@ -1892,7 +1894,7 @@
             <a:fld id="{1D8BD707-D9CF-40AE-B4C6-C98DA3205C09}" type="datetimeFigureOut">
               <a:rPr lang="en-US" smtClean="0"/>
               <a:pPr/>
-              <a:t>10/29/2022</a:t>
+              <a:t>10/31/2022</a:t>
             </a:fld>
             <a:endParaRPr lang="en-US" dirty="0"/>
           </a:p>
@@ -1984,7 +1986,7 @@
             <a:fld id="{1D8BD707-D9CF-40AE-B4C6-C98DA3205C09}" type="datetimeFigureOut">
               <a:rPr lang="en-US" smtClean="0"/>
               <a:pPr/>
-              <a:t>10/29/2022</a:t>
+              <a:t>10/31/2022</a:t>
             </a:fld>
             <a:endParaRPr lang="en-US" dirty="0"/>
           </a:p>
@@ -2256,7 +2258,7 @@
             <a:fld id="{1D8BD707-D9CF-40AE-B4C6-C98DA3205C09}" type="datetimeFigureOut">
               <a:rPr lang="en-US" smtClean="0"/>
               <a:pPr/>
-              <a:t>10/29/2022</a:t>
+              <a:t>10/31/2022</a:t>
             </a:fld>
             <a:endParaRPr lang="en-US" dirty="0"/>
           </a:p>
@@ -2505,7 +2507,7 @@
             <a:fld id="{1D8BD707-D9CF-40AE-B4C6-C98DA3205C09}" type="datetimeFigureOut">
               <a:rPr lang="en-US" smtClean="0"/>
               <a:pPr/>
-              <a:t>10/29/2022</a:t>
+              <a:t>10/31/2022</a:t>
             </a:fld>
             <a:endParaRPr lang="en-US" dirty="0"/>
           </a:p>
@@ -2713,7 +2715,7 @@
             <a:fld id="{1D8BD707-D9CF-40AE-B4C6-C98DA3205C09}" type="datetimeFigureOut">
               <a:rPr lang="en-US" smtClean="0"/>
               <a:pPr/>
-              <a:t>10/29/2022</a:t>
+              <a:t>10/31/2022</a:t>
             </a:fld>
             <a:endParaRPr lang="en-US" dirty="0"/>
           </a:p>
@@ -3558,6 +3560,799 @@
         </p:blipFill>
         <p:spPr>
           <a:xfrm>
+            <a:off x="7261339" y="5143500"/>
+            <a:ext cx="3765323" cy="3765323"/>
+          </a:xfrm>
+          <a:prstGeom prst="rect">
+            <a:avLst/>
+          </a:prstGeom>
+        </p:spPr>
+      </p:pic>
+      <p:sp>
+        <p:nvSpPr>
+          <p:cNvPr id="5" name="TextBox 5"/>
+          <p:cNvSpPr txBox="1"/>
+          <p:nvPr/>
+        </p:nvSpPr>
+        <p:spPr>
+          <a:xfrm>
+            <a:off x="4167855" y="2557829"/>
+            <a:ext cx="9952291" cy="1485900"/>
+          </a:xfrm>
+          <a:prstGeom prst="rect">
+            <a:avLst/>
+          </a:prstGeom>
+        </p:spPr>
+        <p:txBody>
+          <a:bodyPr lIns="0" tIns="0" rIns="0" bIns="0" rtlCol="0" anchor="t">
+            <a:spAutoFit/>
+          </a:bodyPr>
+          <a:lstStyle/>
+          <a:p>
+            <a:pPr algn="ctr">
+              <a:lnSpc>
+                <a:spcPts val="11697"/>
+              </a:lnSpc>
+            </a:pPr>
+            <a:r>
+              <a:rPr lang="en-US" sz="9748" spc="350" dirty="0">
+                <a:solidFill>
+                  <a:srgbClr val="FFFFFF"/>
+                </a:solidFill>
+                <a:latin typeface="Roboto"/>
+              </a:rPr>
+              <a:t>Wireshark Analiz</a:t>
+            </a:r>
+          </a:p>
+        </p:txBody>
+      </p:sp>
+    </p:spTree>
+    <p:extLst>
+      <p:ext uri="{BB962C8B-B14F-4D97-AF65-F5344CB8AC3E}">
+        <p14:creationId xmlns:p14="http://schemas.microsoft.com/office/powerpoint/2010/main" val="917403743"/>
+      </p:ext>
+    </p:extLst>
+  </p:cSld>
+  <p:clrMapOvr>
+    <a:masterClrMapping/>
+  </p:clrMapOvr>
+</p:sld>
+</file>
+
+<file path=ppt/slides/slide11.xml><?xml version="1.0" encoding="utf-8"?>
+<p:sld xmlns:a="http://schemas.openxmlformats.org/drawingml/2006/main" xmlns:r="http://schemas.openxmlformats.org/officeDocument/2006/relationships" xmlns:p="http://schemas.openxmlformats.org/presentationml/2006/main">
+  <p:cSld>
+    <p:spTree>
+      <p:nvGrpSpPr>
+        <p:cNvPr id="1" name=""/>
+        <p:cNvGrpSpPr/>
+        <p:nvPr/>
+      </p:nvGrpSpPr>
+      <p:grpSpPr>
+        <a:xfrm>
+          <a:off x="0" y="0"/>
+          <a:ext cx="0" cy="0"/>
+          <a:chOff x="0" y="0"/>
+          <a:chExt cx="0" cy="0"/>
+        </a:xfrm>
+      </p:grpSpPr>
+      <p:pic>
+        <p:nvPicPr>
+          <p:cNvPr id="2" name="Picture 2"/>
+          <p:cNvPicPr>
+            <a:picLocks noChangeAspect="1"/>
+          </p:cNvPicPr>
+          <p:nvPr/>
+        </p:nvPicPr>
+        <p:blipFill>
+          <a:blip r:embed="rId2"/>
+          <a:srcRect t="7812" b="7812"/>
+          <a:stretch>
+            <a:fillRect/>
+          </a:stretch>
+        </p:blipFill>
+        <p:spPr>
+          <a:xfrm>
+            <a:off x="0" y="0"/>
+            <a:ext cx="18288000" cy="10287000"/>
+          </a:xfrm>
+          <a:prstGeom prst="rect">
+            <a:avLst/>
+          </a:prstGeom>
+        </p:spPr>
+      </p:pic>
+      <p:sp>
+        <p:nvSpPr>
+          <p:cNvPr id="3" name="AutoShape 3"/>
+          <p:cNvSpPr/>
+          <p:nvPr/>
+        </p:nvSpPr>
+        <p:spPr>
+          <a:xfrm rot="1447">
+            <a:off x="16294480" y="9219997"/>
+            <a:ext cx="964812" cy="0"/>
+          </a:xfrm>
+          <a:prstGeom prst="line">
+            <a:avLst/>
+          </a:prstGeom>
+          <a:ln w="38100" cap="rnd">
+            <a:solidFill>
+              <a:srgbClr val="F6F6F6"/>
+            </a:solidFill>
+            <a:prstDash val="solid"/>
+            <a:headEnd type="none" w="sm" len="sm"/>
+            <a:tailEnd type="arrow" w="med" len="sm"/>
+          </a:ln>
+        </p:spPr>
+      </p:sp>
+      <p:sp>
+        <p:nvSpPr>
+          <p:cNvPr id="4" name="TextBox 4"/>
+          <p:cNvSpPr txBox="1"/>
+          <p:nvPr/>
+        </p:nvSpPr>
+        <p:spPr>
+          <a:xfrm>
+            <a:off x="3830638" y="1019175"/>
+            <a:ext cx="10626723" cy="5581650"/>
+          </a:xfrm>
+          <a:prstGeom prst="rect">
+            <a:avLst/>
+          </a:prstGeom>
+        </p:spPr>
+        <p:txBody>
+          <a:bodyPr lIns="0" tIns="0" rIns="0" bIns="0" rtlCol="0" anchor="t">
+            <a:spAutoFit/>
+          </a:bodyPr>
+          <a:lstStyle/>
+          <a:p>
+            <a:pPr>
+              <a:lnSpc>
+                <a:spcPts val="3599"/>
+              </a:lnSpc>
+            </a:pPr>
+            <a:r>
+              <a:rPr lang="en-US" sz="2999" spc="107" dirty="0">
+                <a:solidFill>
+                  <a:srgbClr val="018FF5"/>
+                </a:solidFill>
+                <a:latin typeface="Roboto Bold"/>
+              </a:rPr>
+              <a:t>Wireshark</a:t>
+            </a:r>
+            <a:r>
+              <a:rPr lang="en-US" sz="2999" spc="107" dirty="0">
+                <a:solidFill>
+                  <a:srgbClr val="F6F6F6"/>
+                </a:solidFill>
+                <a:latin typeface="Roboto"/>
+              </a:rPr>
+              <a:t>-dan </a:t>
+            </a:r>
+            <a:r>
+              <a:rPr lang="en-US" sz="2999" spc="107" dirty="0">
+                <a:solidFill>
+                  <a:srgbClr val="FFD230"/>
+                </a:solidFill>
+                <a:latin typeface="Roboto"/>
+              </a:rPr>
+              <a:t>İd</a:t>
+            </a:r>
+            <a:r>
+              <a:rPr lang="en-US" sz="2999" spc="107" dirty="0">
+                <a:solidFill>
+                  <a:srgbClr val="F6F6F6"/>
+                </a:solidFill>
+                <a:latin typeface="Roboto"/>
+              </a:rPr>
+              <a:t> və </a:t>
+            </a:r>
+            <a:r>
+              <a:rPr lang="en-US" sz="2999" spc="107" dirty="0">
+                <a:solidFill>
+                  <a:srgbClr val="FFD230"/>
+                </a:solidFill>
+                <a:latin typeface="Roboto"/>
+              </a:rPr>
+              <a:t>parol</a:t>
+            </a:r>
+            <a:r>
+              <a:rPr lang="en-US" sz="2999" spc="107" dirty="0">
+                <a:solidFill>
+                  <a:srgbClr val="F6F6F6"/>
+                </a:solidFill>
+                <a:latin typeface="Roboto"/>
+              </a:rPr>
+              <a:t>-u tapmaq üçün ilk öncə </a:t>
+            </a:r>
+            <a:r>
+              <a:rPr lang="en-US" sz="2999" spc="107" dirty="0">
+                <a:solidFill>
+                  <a:srgbClr val="018FF5"/>
+                </a:solidFill>
+                <a:latin typeface="Roboto Bold"/>
+              </a:rPr>
+              <a:t>Wireshark</a:t>
+            </a:r>
+            <a:r>
+              <a:rPr lang="en-US" sz="2999" spc="107" dirty="0">
+                <a:solidFill>
+                  <a:srgbClr val="F6F6F6"/>
+                </a:solidFill>
+                <a:latin typeface="Roboto"/>
+              </a:rPr>
+              <a:t>-a daxil olduq.</a:t>
+            </a:r>
+            <a:r>
+              <a:rPr lang="en-US" sz="2999" spc="107" dirty="0">
+                <a:solidFill>
+                  <a:srgbClr val="FFD230"/>
+                </a:solidFill>
+                <a:latin typeface="Roboto Bold"/>
+              </a:rPr>
+              <a:t>Parol</a:t>
+            </a:r>
+            <a:r>
+              <a:rPr lang="en-US" sz="2999" spc="107" dirty="0">
+                <a:solidFill>
+                  <a:srgbClr val="F6F6F6"/>
+                </a:solidFill>
+                <a:latin typeface="Roboto"/>
+              </a:rPr>
+              <a:t> və </a:t>
+            </a:r>
+            <a:r>
+              <a:rPr lang="en-US" sz="2999" spc="107" dirty="0">
+                <a:solidFill>
+                  <a:srgbClr val="FFD230"/>
+                </a:solidFill>
+                <a:latin typeface="Roboto Bold"/>
+              </a:rPr>
+              <a:t>id</a:t>
+            </a:r>
+            <a:r>
+              <a:rPr lang="en-US" sz="2999" spc="107" dirty="0">
+                <a:solidFill>
+                  <a:srgbClr val="F6F6F6"/>
+                </a:solidFill>
+                <a:latin typeface="Roboto"/>
+              </a:rPr>
+              <a:t> ni tapmaq üçün serverə qoşduğumuz </a:t>
+            </a:r>
+            <a:r>
+              <a:rPr lang="en-US" sz="2999" spc="107" dirty="0">
+                <a:solidFill>
+                  <a:srgbClr val="018FF5"/>
+                </a:solidFill>
+                <a:latin typeface="Roboto Bold"/>
+              </a:rPr>
+              <a:t>react app</a:t>
+            </a:r>
+            <a:r>
+              <a:rPr lang="en-US" sz="2999" spc="107" dirty="0">
+                <a:solidFill>
+                  <a:srgbClr val="F6F6F6"/>
+                </a:solidFill>
+                <a:latin typeface="Roboto"/>
+              </a:rPr>
+              <a:t>-ı brauzerdə açdıq və istifadəçi adı və şifrəsi daxil etdik.</a:t>
+            </a:r>
+          </a:p>
+          <a:p>
+            <a:pPr>
+              <a:lnSpc>
+                <a:spcPts val="3599"/>
+              </a:lnSpc>
+            </a:pPr>
+            <a:r>
+              <a:rPr lang="en-US" sz="2999" spc="107" dirty="0">
+                <a:solidFill>
+                  <a:srgbClr val="F6F6F6"/>
+                </a:solidFill>
+                <a:latin typeface="Roboto"/>
+              </a:rPr>
+              <a:t>Daha sonra </a:t>
+            </a:r>
+            <a:r>
+              <a:rPr lang="en-US" sz="2999" spc="107" dirty="0">
+                <a:solidFill>
+                  <a:srgbClr val="018FF5"/>
+                </a:solidFill>
+                <a:latin typeface="Roboto Bold"/>
+              </a:rPr>
+              <a:t>Wireshark</a:t>
+            </a:r>
+            <a:r>
+              <a:rPr lang="en-US" sz="2999" spc="107" dirty="0">
+                <a:solidFill>
+                  <a:srgbClr val="F6F6F6"/>
+                </a:solidFill>
+                <a:latin typeface="Roboto"/>
+              </a:rPr>
+              <a:t>-la analiz edərək bu </a:t>
+            </a:r>
+            <a:r>
+              <a:rPr lang="en-US" sz="2999" spc="107" dirty="0">
+                <a:solidFill>
+                  <a:srgbClr val="FFD230"/>
+                </a:solidFill>
+                <a:latin typeface="Roboto Bold"/>
+              </a:rPr>
+              <a:t>İd</a:t>
+            </a:r>
+            <a:r>
+              <a:rPr lang="en-US" sz="2999" spc="107" dirty="0">
+                <a:solidFill>
+                  <a:srgbClr val="F6F6F6"/>
+                </a:solidFill>
+                <a:latin typeface="Roboto"/>
+              </a:rPr>
+              <a:t> və </a:t>
+            </a:r>
+            <a:r>
+              <a:rPr lang="en-US" sz="2999" spc="107" dirty="0">
+                <a:solidFill>
+                  <a:srgbClr val="FFD230"/>
+                </a:solidFill>
+                <a:latin typeface="Roboto Bold"/>
+              </a:rPr>
+              <a:t>parol-</a:t>
+            </a:r>
+            <a:r>
+              <a:rPr lang="en-US" sz="2999" spc="107" dirty="0">
+                <a:solidFill>
+                  <a:srgbClr val="F6F6F6"/>
+                </a:solidFill>
+                <a:latin typeface="Roboto"/>
+              </a:rPr>
+              <a:t>u aşkar etdik.</a:t>
+            </a:r>
+          </a:p>
+          <a:p>
+            <a:pPr>
+              <a:lnSpc>
+                <a:spcPts val="3599"/>
+              </a:lnSpc>
+            </a:pPr>
+            <a:r>
+              <a:rPr lang="en-US" sz="2999" spc="107" dirty="0">
+                <a:solidFill>
+                  <a:srgbClr val="F6F6F6"/>
+                </a:solidFill>
+                <a:latin typeface="Roboto"/>
+              </a:rPr>
+              <a:t>Gedişat:</a:t>
+            </a:r>
+          </a:p>
+          <a:p>
+            <a:pPr>
+              <a:lnSpc>
+                <a:spcPts val="2400"/>
+              </a:lnSpc>
+            </a:pPr>
+            <a:r>
+              <a:rPr lang="en-US" sz="2000" spc="72" dirty="0">
+                <a:solidFill>
+                  <a:srgbClr val="F6F6F6"/>
+                </a:solidFill>
+                <a:latin typeface="Roboto"/>
+              </a:rPr>
+              <a:t>1.</a:t>
+            </a:r>
+            <a:r>
+              <a:rPr lang="en-US" sz="2000" spc="72" dirty="0">
+                <a:solidFill>
+                  <a:srgbClr val="018FF5"/>
+                </a:solidFill>
+                <a:latin typeface="Roboto Bold"/>
+              </a:rPr>
+              <a:t>Wireshark</a:t>
+            </a:r>
+            <a:r>
+              <a:rPr lang="en-US" sz="2000" spc="72" dirty="0">
+                <a:solidFill>
+                  <a:srgbClr val="F6F6F6"/>
+                </a:solidFill>
+                <a:latin typeface="Roboto"/>
+              </a:rPr>
+              <a:t>-i admin olaraq başladırıq və daha sonra </a:t>
+            </a:r>
+            <a:r>
+              <a:rPr lang="en-US" sz="2000" spc="72" dirty="0">
+                <a:solidFill>
+                  <a:srgbClr val="018FF5"/>
+                </a:solidFill>
+                <a:latin typeface="Roboto Bold"/>
+              </a:rPr>
+              <a:t>Adapter for loopback traffic capture</a:t>
+            </a:r>
+            <a:r>
+              <a:rPr lang="en-US" sz="2000" spc="72" dirty="0">
+                <a:solidFill>
+                  <a:srgbClr val="F6F6F6"/>
+                </a:solidFill>
+                <a:latin typeface="Roboto"/>
+              </a:rPr>
+              <a:t> hissəsinə daxil olduq.</a:t>
+            </a:r>
+          </a:p>
+          <a:p>
+            <a:pPr>
+              <a:lnSpc>
+                <a:spcPts val="2400"/>
+              </a:lnSpc>
+            </a:pPr>
+            <a:r>
+              <a:rPr lang="en-US" sz="2000" spc="72" dirty="0">
+                <a:solidFill>
+                  <a:srgbClr val="F6F6F6"/>
+                </a:solidFill>
+                <a:latin typeface="Roboto"/>
+              </a:rPr>
+              <a:t>2.Daha sora brauzerdən </a:t>
+            </a:r>
+            <a:r>
+              <a:rPr lang="en-US" sz="2000" spc="72" dirty="0">
+                <a:solidFill>
+                  <a:srgbClr val="018FF5"/>
+                </a:solidFill>
+                <a:latin typeface="Roboto Bold"/>
+              </a:rPr>
+              <a:t>127.0.0.1</a:t>
+            </a:r>
+            <a:r>
+              <a:rPr lang="en-US" sz="2000" spc="72" dirty="0">
+                <a:solidFill>
+                  <a:srgbClr val="F6F6F6"/>
+                </a:solidFill>
+                <a:latin typeface="Roboto"/>
+              </a:rPr>
+              <a:t> səhifəsinə daxil olaraq </a:t>
+            </a:r>
+            <a:r>
+              <a:rPr lang="en-US" sz="2000" spc="72" dirty="0">
+                <a:solidFill>
+                  <a:srgbClr val="FFD230"/>
+                </a:solidFill>
+                <a:latin typeface="Roboto Bold"/>
+              </a:rPr>
+              <a:t>istifadəçi adı</a:t>
+            </a:r>
+            <a:r>
+              <a:rPr lang="en-US" sz="2000" spc="72" dirty="0">
+                <a:solidFill>
+                  <a:srgbClr val="F6F6F6"/>
+                </a:solidFill>
+                <a:latin typeface="Roboto"/>
+              </a:rPr>
+              <a:t> və </a:t>
+            </a:r>
+            <a:r>
+              <a:rPr lang="en-US" sz="2000" spc="72" dirty="0">
+                <a:solidFill>
+                  <a:srgbClr val="FFD230"/>
+                </a:solidFill>
+                <a:latin typeface="Roboto Bold"/>
+              </a:rPr>
+              <a:t>parol-</a:t>
+            </a:r>
+            <a:r>
+              <a:rPr lang="en-US" sz="2000" spc="72" dirty="0">
+                <a:solidFill>
+                  <a:srgbClr val="F6F6F6"/>
+                </a:solidFill>
+                <a:latin typeface="Roboto"/>
+              </a:rPr>
+              <a:t>u daxil etdik.</a:t>
+            </a:r>
+          </a:p>
+          <a:p>
+            <a:pPr>
+              <a:lnSpc>
+                <a:spcPts val="2400"/>
+              </a:lnSpc>
+            </a:pPr>
+            <a:r>
+              <a:rPr lang="en-US" sz="2000" spc="72" dirty="0">
+                <a:solidFill>
+                  <a:srgbClr val="F6F6F6"/>
+                </a:solidFill>
+                <a:latin typeface="Roboto"/>
+              </a:rPr>
+              <a:t>3.</a:t>
+            </a:r>
+            <a:r>
+              <a:rPr lang="en-US" sz="2000" spc="72" dirty="0">
+                <a:solidFill>
+                  <a:srgbClr val="018FF5"/>
+                </a:solidFill>
+                <a:latin typeface="Roboto Bold"/>
+              </a:rPr>
+              <a:t>Wireshark</a:t>
+            </a:r>
+            <a:r>
+              <a:rPr lang="en-US" sz="2000" spc="72" dirty="0">
+                <a:solidFill>
+                  <a:srgbClr val="F6F6F6"/>
+                </a:solidFill>
+                <a:latin typeface="Roboto"/>
+              </a:rPr>
+              <a:t>-a geri qayıtdığımızda qarşımızda bit çox məlumat çıxdı.Ancaq bizə lazım olanı tapmaq üçün </a:t>
+            </a:r>
+            <a:r>
+              <a:rPr lang="en-US" sz="2000" spc="72" dirty="0">
+                <a:solidFill>
+                  <a:srgbClr val="018FF5"/>
+                </a:solidFill>
+                <a:latin typeface="Roboto Bold"/>
+              </a:rPr>
+              <a:t>filter</a:t>
+            </a:r>
+            <a:r>
+              <a:rPr lang="en-US" sz="2000" spc="72" dirty="0">
+                <a:solidFill>
+                  <a:srgbClr val="F6F6F6"/>
+                </a:solidFill>
+                <a:latin typeface="Roboto"/>
+              </a:rPr>
+              <a:t> hissəsinə </a:t>
+            </a:r>
+            <a:r>
+              <a:rPr lang="en-US" sz="2000" spc="72" dirty="0">
+                <a:solidFill>
+                  <a:srgbClr val="018FF5"/>
+                </a:solidFill>
+                <a:latin typeface="Roboto Bold"/>
+              </a:rPr>
+              <a:t>http</a:t>
+            </a:r>
+            <a:r>
+              <a:rPr lang="en-US" sz="2000" spc="72" dirty="0">
+                <a:solidFill>
+                  <a:srgbClr val="F6F6F6"/>
+                </a:solidFill>
+                <a:latin typeface="Roboto"/>
+              </a:rPr>
+              <a:t> yazdıq və gələn nəticələrin içindən ən sonlarda </a:t>
+            </a:r>
+            <a:r>
+              <a:rPr lang="en-US" sz="2000" spc="72" dirty="0">
+                <a:solidFill>
+                  <a:srgbClr val="018FF5"/>
+                </a:solidFill>
+                <a:latin typeface="Roboto Bold"/>
+              </a:rPr>
+              <a:t>Post</a:t>
+            </a:r>
+            <a:r>
+              <a:rPr lang="en-US" sz="2000" spc="72" dirty="0">
+                <a:solidFill>
+                  <a:srgbClr val="F6F6F6"/>
+                </a:solidFill>
+                <a:latin typeface="Roboto"/>
+              </a:rPr>
+              <a:t> olan məlumata tıklayıb sol aşağı hissədən </a:t>
+            </a:r>
+            <a:r>
+              <a:rPr lang="en-US" sz="2000" spc="72" dirty="0">
+                <a:solidFill>
+                  <a:srgbClr val="018FF5"/>
+                </a:solidFill>
+                <a:latin typeface="Roboto Bold"/>
+              </a:rPr>
+              <a:t>Html</a:t>
+            </a:r>
+            <a:r>
+              <a:rPr lang="en-US" sz="2000" spc="72" dirty="0">
+                <a:solidFill>
+                  <a:srgbClr val="F6F6F6"/>
+                </a:solidFill>
+                <a:latin typeface="Roboto"/>
+              </a:rPr>
+              <a:t> ilə başlayan hissəni genişləndirdik.</a:t>
+            </a:r>
+          </a:p>
+        </p:txBody>
+      </p:sp>
+      <p:pic>
+        <p:nvPicPr>
+          <p:cNvPr id="5" name="Picture 5"/>
+          <p:cNvPicPr>
+            <a:picLocks noChangeAspect="1"/>
+          </p:cNvPicPr>
+          <p:nvPr/>
+        </p:nvPicPr>
+        <p:blipFill>
+          <a:blip r:embed="rId3"/>
+          <a:srcRect/>
+          <a:stretch>
+            <a:fillRect/>
+          </a:stretch>
+        </p:blipFill>
+        <p:spPr>
+          <a:xfrm>
+            <a:off x="3255805" y="7357654"/>
+            <a:ext cx="11776389" cy="1211915"/>
+          </a:xfrm>
+          <a:prstGeom prst="rect">
+            <a:avLst/>
+          </a:prstGeom>
+        </p:spPr>
+      </p:pic>
+      <p:grpSp>
+        <p:nvGrpSpPr>
+          <p:cNvPr id="6" name="Group 6"/>
+          <p:cNvGrpSpPr/>
+          <p:nvPr/>
+        </p:nvGrpSpPr>
+        <p:grpSpPr>
+          <a:xfrm>
+            <a:off x="9860703" y="7835132"/>
+            <a:ext cx="773873" cy="1100294"/>
+            <a:chOff x="0" y="0"/>
+            <a:chExt cx="1031831" cy="1467058"/>
+          </a:xfrm>
+        </p:grpSpPr>
+        <p:pic>
+          <p:nvPicPr>
+            <p:cNvPr id="7" name="Picture 7"/>
+            <p:cNvPicPr>
+              <a:picLocks noChangeAspect="1"/>
+            </p:cNvPicPr>
+            <p:nvPr/>
+          </p:nvPicPr>
+          <p:blipFill>
+            <a:blip r:embed="rId4" cstate="print">
+              <a:extLst>
+                <a:ext uri="{28A0092B-C50C-407E-A947-70E740481C1C}">
+                  <a14:useLocalDpi xmlns:a14="http://schemas.microsoft.com/office/drawing/2010/main" val="0"/>
+                </a:ext>
+                <a:ext uri="{96DAC541-7B7A-43D3-8B79-37D633B846F1}">
+                  <asvg:svgBlip xmlns:asvg="http://schemas.microsoft.com/office/drawing/2016/SVG/main" r:embed="rId5"/>
+                </a:ext>
+              </a:extLst>
+            </a:blip>
+            <a:srcRect/>
+            <a:stretch>
+              <a:fillRect/>
+            </a:stretch>
+          </p:blipFill>
+          <p:spPr>
+            <a:xfrm rot="-10800000">
+              <a:off x="0" y="0"/>
+              <a:ext cx="1031831" cy="505597"/>
+            </a:xfrm>
+            <a:prstGeom prst="rect">
+              <a:avLst/>
+            </a:prstGeom>
+          </p:spPr>
+        </p:pic>
+        <p:pic>
+          <p:nvPicPr>
+            <p:cNvPr id="8" name="Picture 8"/>
+            <p:cNvPicPr>
+              <a:picLocks noChangeAspect="1"/>
+            </p:cNvPicPr>
+            <p:nvPr/>
+          </p:nvPicPr>
+          <p:blipFill>
+            <a:blip r:embed="rId6">
+              <a:extLst>
+                <a:ext uri="{28A0092B-C50C-407E-A947-70E740481C1C}">
+                  <a14:useLocalDpi xmlns:a14="http://schemas.microsoft.com/office/drawing/2010/main" val="0"/>
+                </a:ext>
+                <a:ext uri="{96DAC541-7B7A-43D3-8B79-37D633B846F1}">
+                  <asvg:svgBlip xmlns:asvg="http://schemas.microsoft.com/office/drawing/2016/SVG/main" r:embed="rId7"/>
+                </a:ext>
+              </a:extLst>
+            </a:blip>
+            <a:srcRect/>
+            <a:stretch>
+              <a:fillRect/>
+            </a:stretch>
+          </p:blipFill>
+          <p:spPr>
+            <a:xfrm rot="-5596352">
+              <a:off x="-224397" y="806683"/>
+              <a:ext cx="1025629" cy="280766"/>
+            </a:xfrm>
+            <a:prstGeom prst="rect">
+              <a:avLst/>
+            </a:prstGeom>
+          </p:spPr>
+        </p:pic>
+      </p:grpSp>
+    </p:spTree>
+  </p:cSld>
+  <p:clrMapOvr>
+    <a:masterClrMapping/>
+  </p:clrMapOvr>
+</p:sld>
+</file>
+
+<file path=ppt/slides/slide12.xml><?xml version="1.0" encoding="utf-8"?>
+<p:sld xmlns:a="http://schemas.openxmlformats.org/drawingml/2006/main" xmlns:r="http://schemas.openxmlformats.org/officeDocument/2006/relationships" xmlns:p="http://schemas.openxmlformats.org/presentationml/2006/main">
+  <p:cSld>
+    <p:spTree>
+      <p:nvGrpSpPr>
+        <p:cNvPr id="1" name=""/>
+        <p:cNvGrpSpPr/>
+        <p:nvPr/>
+      </p:nvGrpSpPr>
+      <p:grpSpPr>
+        <a:xfrm>
+          <a:off x="0" y="0"/>
+          <a:ext cx="0" cy="0"/>
+          <a:chOff x="0" y="0"/>
+          <a:chExt cx="0" cy="0"/>
+        </a:xfrm>
+      </p:grpSpPr>
+      <p:pic>
+        <p:nvPicPr>
+          <p:cNvPr id="2" name="Picture 2"/>
+          <p:cNvPicPr>
+            <a:picLocks noChangeAspect="1"/>
+          </p:cNvPicPr>
+          <p:nvPr/>
+        </p:nvPicPr>
+        <p:blipFill>
+          <a:blip r:embed="rId2"/>
+          <a:srcRect t="7812" b="7812"/>
+          <a:stretch>
+            <a:fillRect/>
+          </a:stretch>
+        </p:blipFill>
+        <p:spPr>
+          <a:xfrm>
+            <a:off x="0" y="0"/>
+            <a:ext cx="18288000" cy="10287000"/>
+          </a:xfrm>
+          <a:prstGeom prst="rect">
+            <a:avLst/>
+          </a:prstGeom>
+        </p:spPr>
+      </p:pic>
+      <p:sp>
+        <p:nvSpPr>
+          <p:cNvPr id="3" name="AutoShape 3"/>
+          <p:cNvSpPr/>
+          <p:nvPr/>
+        </p:nvSpPr>
+        <p:spPr>
+          <a:xfrm rot="1447">
+            <a:off x="16294480" y="9219997"/>
+            <a:ext cx="964812" cy="0"/>
+          </a:xfrm>
+          <a:prstGeom prst="line">
+            <a:avLst/>
+          </a:prstGeom>
+          <a:ln w="38100" cap="rnd">
+            <a:solidFill>
+              <a:srgbClr val="F6F6F6"/>
+            </a:solidFill>
+            <a:prstDash val="solid"/>
+            <a:headEnd type="none" w="sm" len="sm"/>
+            <a:tailEnd type="arrow" w="med" len="sm"/>
+          </a:ln>
+        </p:spPr>
+      </p:sp>
+      <p:pic>
+        <p:nvPicPr>
+          <p:cNvPr id="4" name="Picture 4"/>
+          <p:cNvPicPr>
+            <a:picLocks noChangeAspect="1"/>
+          </p:cNvPicPr>
+          <p:nvPr/>
+        </p:nvPicPr>
+        <p:blipFill>
+          <a:blip r:embed="rId3"/>
+          <a:srcRect/>
+          <a:stretch>
+            <a:fillRect/>
+          </a:stretch>
+        </p:blipFill>
+        <p:spPr>
+          <a:xfrm>
             <a:off x="4130520" y="3249967"/>
             <a:ext cx="10026961" cy="5135221"/>
           </a:xfrm>
@@ -5887,48 +6682,23 @@
           </a:ln>
         </p:spPr>
       </p:sp>
-      <p:pic>
-        <p:nvPicPr>
-          <p:cNvPr id="4" name="Picture 4"/>
-          <p:cNvPicPr>
-            <a:picLocks noChangeAspect="1"/>
-          </p:cNvPicPr>
+      <p:sp>
+        <p:nvSpPr>
+          <p:cNvPr id="5" name="TextBox 5"/>
+          <p:cNvSpPr txBox="1"/>
           <p:nvPr/>
-        </p:nvPicPr>
-        <p:blipFill>
-          <a:blip r:embed="rId3"/>
-          <a:srcRect/>
-          <a:stretch>
-            <a:fillRect/>
-          </a:stretch>
-        </p:blipFill>
+        </p:nvSpPr>
         <p:spPr>
           <a:xfrm>
-            <a:off x="7261339" y="5143500"/>
-            <a:ext cx="3765323" cy="3765323"/>
+            <a:off x="3036427" y="3643089"/>
+            <a:ext cx="12215146" cy="3000821"/>
           </a:xfrm>
           <a:prstGeom prst="rect">
             <a:avLst/>
           </a:prstGeom>
         </p:spPr>
-      </p:pic>
-      <p:sp>
-        <p:nvSpPr>
-          <p:cNvPr id="5" name="TextBox 5"/>
-          <p:cNvSpPr txBox="1"/>
-          <p:nvPr/>
-        </p:nvSpPr>
-        <p:spPr>
-          <a:xfrm>
-            <a:off x="4167855" y="2557829"/>
-            <a:ext cx="9952291" cy="1485900"/>
-          </a:xfrm>
-          <a:prstGeom prst="rect">
-            <a:avLst/>
-          </a:prstGeom>
-        </p:spPr>
-        <p:txBody>
-          <a:bodyPr lIns="0" tIns="0" rIns="0" bIns="0" rtlCol="0" anchor="t">
+        <p:txBody>
+          <a:bodyPr wrap="square" lIns="0" tIns="0" rIns="0" bIns="0" rtlCol="0" anchor="t">
             <a:spAutoFit/>
           </a:bodyPr>
           <a:lstStyle/>
@@ -5939,14 +6709,77 @@
               </a:lnSpc>
             </a:pPr>
             <a:r>
-              <a:rPr lang="en-US" sz="9748" spc="350" dirty="0">
+              <a:rPr lang="en-US" sz="9750" spc="350" dirty="0">
+                <a:solidFill>
+                  <a:schemeClr val="bg1"/>
+                </a:solidFill>
+                <a:latin typeface="Roboto"/>
+              </a:rPr>
+              <a:t>B</a:t>
+            </a:r>
+            <a:r>
+              <a:rPr lang="az-Latn-AZ" sz="9750" spc="350" dirty="0">
+                <a:solidFill>
+                  <a:schemeClr val="bg1"/>
+                </a:solidFill>
+                <a:latin typeface="Roboto"/>
+              </a:rPr>
+              <a:t>əs </a:t>
+            </a:r>
+            <a:r>
+              <a:rPr lang="en-US" sz="9750" b="0" i="0" u="none" strike="noStrike" dirty="0">
+                <a:solidFill>
+                  <a:schemeClr val="bg1"/>
+                </a:solidFill>
+                <a:effectLst/>
+                <a:latin typeface="Arial" panose="020B0604020202020204" pitchFamily="34" charset="0"/>
+              </a:rPr>
+              <a:t>DNS </a:t>
+            </a:r>
+            <a:r>
+              <a:rPr lang="az-Latn-AZ" sz="9750" dirty="0">
+                <a:solidFill>
+                  <a:schemeClr val="bg1"/>
+                </a:solidFill>
+                <a:latin typeface="Arial" panose="020B0604020202020204" pitchFamily="34" charset="0"/>
+              </a:rPr>
+              <a:t>R</a:t>
+            </a:r>
+            <a:r>
+              <a:rPr lang="en-US" sz="9750" b="0" i="0" u="none" strike="noStrike" dirty="0">
+                <a:solidFill>
+                  <a:schemeClr val="bg1"/>
+                </a:solidFill>
+                <a:effectLst/>
+                <a:latin typeface="Arial" panose="020B0604020202020204" pitchFamily="34" charset="0"/>
+              </a:rPr>
+              <a:t>esolverə</a:t>
+            </a:r>
+            <a:r>
+              <a:rPr lang="az-Latn-AZ" sz="9750" b="0" i="0" u="none" strike="noStrike" dirty="0">
+                <a:solidFill>
+                  <a:schemeClr val="bg1"/>
+                </a:solidFill>
+                <a:effectLst/>
+                <a:latin typeface="Arial" panose="020B0604020202020204" pitchFamily="34" charset="0"/>
+              </a:rPr>
+              <a:t> necə müdaxilə etdik</a:t>
+            </a:r>
+            <a:r>
+              <a:rPr lang="az-Latn-AZ" sz="9748" spc="350" dirty="0">
                 <a:solidFill>
                   <a:srgbClr val="FFFFFF"/>
                 </a:solidFill>
                 <a:latin typeface="Roboto"/>
               </a:rPr>
-              <a:t>Wireshark Analiz</a:t>
-            </a:r>
+              <a:t>?</a:t>
+            </a:r>
+            <a:endParaRPr lang="en-US" sz="9748" spc="350" dirty="0">
+              <a:solidFill>
+                <a:srgbClr val="FFFFFF"/>
+              </a:solidFill>
+              <a:latin typeface="Roboto"/>
+            </a:endParaRPr>
           </a:p>
         </p:txBody>
       </p:sp>
@@ -6026,21 +6859,27 @@
       </p:sp>
       <p:sp>
         <p:nvSpPr>
-          <p:cNvPr id="4" name="TextBox 4"/>
+          <p:cNvPr id="6" name="TextBox 6">
+            <a:extLst>
+              <a:ext uri="{FF2B5EF4-FFF2-40B4-BE49-F238E27FC236}">
+                <a16:creationId xmlns:a16="http://schemas.microsoft.com/office/drawing/2014/main" id="{242E0AE4-5D00-457F-A21E-4BB19D392602}"/>
+              </a:ext>
+            </a:extLst>
+          </p:cNvPr>
           <p:cNvSpPr txBox="1"/>
           <p:nvPr/>
         </p:nvSpPr>
         <p:spPr>
           <a:xfrm>
-            <a:off x="3830638" y="1019175"/>
-            <a:ext cx="10626723" cy="5581650"/>
+            <a:off x="3102683" y="1104900"/>
+            <a:ext cx="12082634" cy="2923877"/>
           </a:xfrm>
           <a:prstGeom prst="rect">
             <a:avLst/>
           </a:prstGeom>
         </p:spPr>
         <p:txBody>
-          <a:bodyPr lIns="0" tIns="0" rIns="0" bIns="0" rtlCol="0" anchor="t">
+          <a:bodyPr wrap="square" lIns="0" tIns="0" rIns="0" bIns="0" rtlCol="0" anchor="t">
             <a:spAutoFit/>
           </a:bodyPr>
           <a:lstStyle/>
@@ -6051,131 +6890,40 @@
               </a:lnSpc>
             </a:pPr>
             <a:r>
-              <a:rPr lang="en-US" sz="2999" spc="107" dirty="0">
-                <a:solidFill>
-                  <a:srgbClr val="018FF5"/>
+              <a:rPr lang="az-Latn-AZ" sz="2999" spc="107" dirty="0">
+                <a:solidFill>
+                  <a:srgbClr val="0070C0"/>
                 </a:solidFill>
                 <a:latin typeface="Roboto Bold"/>
               </a:rPr>
-              <a:t>Wireshark</a:t>
-            </a:r>
-            <a:r>
-              <a:rPr lang="en-US" sz="2999" spc="107" dirty="0">
-                <a:solidFill>
-                  <a:srgbClr val="F6F6F6"/>
-                </a:solidFill>
-                <a:latin typeface="Roboto"/>
-              </a:rPr>
-              <a:t>-dan </a:t>
-            </a:r>
-            <a:r>
-              <a:rPr lang="en-US" sz="2999" spc="107" dirty="0">
-                <a:solidFill>
-                  <a:srgbClr val="FFD230"/>
-                </a:solidFill>
-                <a:latin typeface="Roboto"/>
-              </a:rPr>
-              <a:t>İd</a:t>
-            </a:r>
-            <a:r>
-              <a:rPr lang="en-US" sz="2999" spc="107" dirty="0">
-                <a:solidFill>
-                  <a:srgbClr val="F6F6F6"/>
-                </a:solidFill>
-                <a:latin typeface="Roboto"/>
-              </a:rPr>
-              <a:t> və </a:t>
-            </a:r>
-            <a:r>
-              <a:rPr lang="en-US" sz="2999" spc="107" dirty="0">
-                <a:solidFill>
-                  <a:srgbClr val="FFD230"/>
-                </a:solidFill>
-                <a:latin typeface="Roboto"/>
-              </a:rPr>
-              <a:t>parol</a:t>
-            </a:r>
-            <a:r>
-              <a:rPr lang="en-US" sz="2999" spc="107" dirty="0">
-                <a:solidFill>
-                  <a:srgbClr val="F6F6F6"/>
-                </a:solidFill>
-                <a:latin typeface="Roboto"/>
-              </a:rPr>
-              <a:t>-u tapmaq üçün ilk öncə </a:t>
-            </a:r>
-            <a:r>
-              <a:rPr lang="en-US" sz="2999" spc="107" dirty="0">
-                <a:solidFill>
-                  <a:srgbClr val="018FF5"/>
+              <a:t>DNS</a:t>
+            </a:r>
+            <a:r>
+              <a:rPr lang="az-Latn-AZ" sz="2999" spc="107" dirty="0">
+                <a:solidFill>
+                  <a:schemeClr val="bg1"/>
                 </a:solidFill>
                 <a:latin typeface="Roboto Bold"/>
               </a:rPr>
-              <a:t>Wireshark</a:t>
-            </a:r>
-            <a:r>
-              <a:rPr lang="en-US" sz="2999" spc="107" dirty="0">
-                <a:solidFill>
-                  <a:srgbClr val="F6F6F6"/>
-                </a:solidFill>
-                <a:latin typeface="Roboto"/>
-              </a:rPr>
-              <a:t>-a daxil olduq.</a:t>
-            </a:r>
-            <a:r>
-              <a:rPr lang="en-US" sz="2999" spc="107" dirty="0">
-                <a:solidFill>
-                  <a:srgbClr val="FFD230"/>
-                </a:solidFill>
-                <a:latin typeface="Roboto Bold"/>
-              </a:rPr>
-              <a:t>Parol</a:t>
-            </a:r>
-            <a:r>
-              <a:rPr lang="en-US" sz="2999" spc="107" dirty="0">
-                <a:solidFill>
-                  <a:srgbClr val="F6F6F6"/>
-                </a:solidFill>
-                <a:latin typeface="Roboto"/>
-              </a:rPr>
-              <a:t> və </a:t>
-            </a:r>
-            <a:r>
-              <a:rPr lang="en-US" sz="2999" spc="107" dirty="0">
-                <a:solidFill>
-                  <a:srgbClr val="FFD230"/>
-                </a:solidFill>
-                <a:latin typeface="Roboto Bold"/>
-              </a:rPr>
-              <a:t>id</a:t>
-            </a:r>
-            <a:r>
-              <a:rPr lang="en-US" sz="2999" spc="107" dirty="0">
-                <a:solidFill>
-                  <a:srgbClr val="F6F6F6"/>
-                </a:solidFill>
-                <a:latin typeface="Roboto"/>
-              </a:rPr>
-              <a:t> ni tapmaq üçün serverə qoşduğumuz </a:t>
-            </a:r>
-            <a:r>
-              <a:rPr lang="en-US" sz="2999" spc="107" dirty="0">
-                <a:solidFill>
-                  <a:srgbClr val="018FF5"/>
-                </a:solidFill>
-                <a:latin typeface="Roboto Bold"/>
-              </a:rPr>
-              <a:t>react app</a:t>
-            </a:r>
-            <a:r>
-              <a:rPr lang="en-US" sz="2999" spc="107" dirty="0">
-                <a:solidFill>
-                  <a:srgbClr val="F6F6F6"/>
-                </a:solidFill>
-                <a:latin typeface="Roboto"/>
-              </a:rPr>
-              <a:t>-ı brauzerdə açdıq və istifadəçi adı və şifrəsi daxil etdik.</a:t>
-            </a:r>
+              <a:t>-ə müdaxilə etmək üçün </a:t>
+            </a:r>
+            <a:r>
+              <a:rPr lang="en-US" sz="3000" b="0" i="0" u="none" strike="noStrike" dirty="0">
+                <a:solidFill>
+                  <a:schemeClr val="bg1"/>
+                </a:solidFill>
+                <a:effectLst/>
+                <a:latin typeface="Arial" panose="020B0604020202020204" pitchFamily="34" charset="0"/>
+              </a:rPr>
+              <a:t>C:\Windows\System32\drivers\etc\hosts</a:t>
+            </a:r>
+            <a:endParaRPr lang="az-Latn-AZ" sz="3000" b="0" i="0" u="none" strike="noStrike" dirty="0">
+              <a:solidFill>
+                <a:schemeClr val="bg1"/>
+              </a:solidFill>
+              <a:effectLst/>
+              <a:latin typeface="Arial" panose="020B0604020202020204" pitchFamily="34" charset="0"/>
+            </a:endParaRPr>
           </a:p>
           <a:p>
             <a:pPr>
@@ -6184,67 +6932,49 @@
               </a:lnSpc>
             </a:pPr>
             <a:r>
-              <a:rPr lang="en-US" sz="2999" spc="107" dirty="0">
-                <a:solidFill>
-                  <a:srgbClr val="F6F6F6"/>
-                </a:solidFill>
-                <a:latin typeface="Roboto"/>
-              </a:rPr>
-              <a:t>Daha sonra </a:t>
-            </a:r>
-            <a:r>
-              <a:rPr lang="en-US" sz="2999" spc="107" dirty="0">
-                <a:solidFill>
-                  <a:srgbClr val="018FF5"/>
-                </a:solidFill>
-                <a:latin typeface="Roboto Bold"/>
-              </a:rPr>
-              <a:t>Wireshark</a:t>
-            </a:r>
-            <a:r>
-              <a:rPr lang="en-US" sz="2999" spc="107" dirty="0">
-                <a:solidFill>
-                  <a:srgbClr val="F6F6F6"/>
-                </a:solidFill>
-                <a:latin typeface="Roboto"/>
-              </a:rPr>
-              <a:t>-la analiz edərək bu </a:t>
-            </a:r>
-            <a:r>
-              <a:rPr lang="en-US" sz="2999" spc="107" dirty="0">
-                <a:solidFill>
-                  <a:srgbClr val="FFD230"/>
-                </a:solidFill>
-                <a:latin typeface="Roboto Bold"/>
-              </a:rPr>
-              <a:t>İd</a:t>
-            </a:r>
-            <a:r>
-              <a:rPr lang="en-US" sz="2999" spc="107" dirty="0">
-                <a:solidFill>
-                  <a:srgbClr val="F6F6F6"/>
-                </a:solidFill>
-                <a:latin typeface="Roboto"/>
-              </a:rPr>
-              <a:t> və </a:t>
-            </a:r>
-            <a:r>
-              <a:rPr lang="en-US" sz="2999" spc="107" dirty="0">
-                <a:solidFill>
-                  <a:srgbClr val="FFD230"/>
-                </a:solidFill>
-                <a:latin typeface="Roboto Bold"/>
-              </a:rPr>
-              <a:t>parol-</a:t>
-            </a:r>
-            <a:r>
-              <a:rPr lang="en-US" sz="2999" spc="107" dirty="0">
-                <a:solidFill>
-                  <a:srgbClr val="F6F6F6"/>
-                </a:solidFill>
-                <a:latin typeface="Roboto"/>
-              </a:rPr>
-              <a:t>u aşkar etdik.</a:t>
+              <a:rPr lang="az-Latn-AZ" sz="3000" spc="107" dirty="0">
+                <a:solidFill>
+                  <a:schemeClr val="bg1"/>
+                </a:solidFill>
+                <a:latin typeface="Arial" panose="020B0604020202020204" pitchFamily="34" charset="0"/>
+              </a:rPr>
+              <a:t>Locationunu tapdıq və </a:t>
+            </a:r>
+            <a:r>
+              <a:rPr lang="az-Latn-AZ" sz="3000" spc="107" dirty="0">
+                <a:solidFill>
+                  <a:srgbClr val="0070C0"/>
+                </a:solidFill>
+                <a:latin typeface="Arial" panose="020B0604020202020204" pitchFamily="34" charset="0"/>
+              </a:rPr>
+              <a:t>hosts</a:t>
+            </a:r>
+            <a:r>
+              <a:rPr lang="az-Latn-AZ" sz="3000" spc="107" dirty="0">
+                <a:solidFill>
+                  <a:schemeClr val="bg1"/>
+                </a:solidFill>
+                <a:latin typeface="Arial" panose="020B0604020202020204" pitchFamily="34" charset="0"/>
+              </a:rPr>
+              <a:t> faylını </a:t>
+            </a:r>
+            <a:r>
+              <a:rPr lang="az-Latn-AZ" sz="3000" spc="107" dirty="0">
+                <a:solidFill>
+                  <a:srgbClr val="0070C0"/>
+                </a:solidFill>
+                <a:latin typeface="Arial" panose="020B0604020202020204" pitchFamily="34" charset="0"/>
+              </a:rPr>
+              <a:t>notepad</a:t>
+            </a:r>
+            <a:r>
+              <a:rPr lang="az-Latn-AZ" sz="3000" spc="107" dirty="0">
+                <a:solidFill>
+                  <a:schemeClr val="bg1"/>
+                </a:solidFill>
+                <a:latin typeface="Arial" panose="020B0604020202020204" pitchFamily="34" charset="0"/>
+              </a:rPr>
+              <a:t> vasitəsi ilə açdıq.</a:t>
             </a:r>
           </a:p>
           <a:p>
@@ -6264,6 +6994,64 @@
             </a:r>
           </a:p>
           <a:p>
+            <a:pPr marL="457200" indent="-457200">
+              <a:lnSpc>
+                <a:spcPts val="2400"/>
+              </a:lnSpc>
+              <a:buAutoNum type="arabicPeriod"/>
+            </a:pPr>
+            <a:r>
+              <a:rPr lang="en-US" sz="2000" b="0" i="0" u="none" strike="noStrike" dirty="0">
+                <a:solidFill>
+                  <a:srgbClr val="0070C0"/>
+                </a:solidFill>
+                <a:effectLst/>
+                <a:latin typeface="Arial" panose="020B0604020202020204" pitchFamily="34" charset="0"/>
+              </a:rPr>
+              <a:t>C:\Windows\System32\drivers\etc\hosts</a:t>
+            </a:r>
+            <a:r>
+              <a:rPr lang="az-Latn-AZ" sz="2000" b="0" i="0" u="none" strike="noStrike" dirty="0">
+                <a:solidFill>
+                  <a:srgbClr val="0070C0"/>
+                </a:solidFill>
+                <a:effectLst/>
+                <a:latin typeface="Arial" panose="020B0604020202020204" pitchFamily="34" charset="0"/>
+              </a:rPr>
+              <a:t> </a:t>
+            </a:r>
+            <a:r>
+              <a:rPr lang="az-Latn-AZ" sz="2000" b="0" i="0" u="none" strike="noStrike" dirty="0">
+                <a:solidFill>
+                  <a:schemeClr val="bg1"/>
+                </a:solidFill>
+                <a:effectLst/>
+                <a:latin typeface="Arial" panose="020B0604020202020204" pitchFamily="34" charset="0"/>
+              </a:rPr>
+              <a:t>faylını </a:t>
+            </a:r>
+            <a:r>
+              <a:rPr lang="az-Latn-AZ" sz="2000" b="1" i="0" u="none" strike="noStrike" dirty="0">
+                <a:solidFill>
+                  <a:srgbClr val="0070C0"/>
+                </a:solidFill>
+                <a:effectLst/>
+                <a:latin typeface="Arial" panose="020B0604020202020204" pitchFamily="34" charset="0"/>
+              </a:rPr>
+              <a:t>notepad</a:t>
+            </a:r>
+            <a:r>
+              <a:rPr lang="az-Latn-AZ" sz="2000" b="0" i="0" u="none" strike="noStrike" dirty="0">
+                <a:solidFill>
+                  <a:schemeClr val="bg1"/>
+                </a:solidFill>
+                <a:effectLst/>
+                <a:latin typeface="Arial" panose="020B0604020202020204" pitchFamily="34" charset="0"/>
+              </a:rPr>
+              <a:t>-da açırıq.</a:t>
+            </a:r>
+          </a:p>
+          <a:p>
             <a:pPr>
               <a:lnSpc>
                 <a:spcPts val="2400"/>
@@ -6276,43 +7064,34 @@
                 </a:solidFill>
                 <a:latin typeface="Roboto"/>
               </a:rPr>
-              <a:t>1.</a:t>
-            </a:r>
-            <a:r>
-              <a:rPr lang="en-US" sz="2000" spc="72" dirty="0">
-                <a:solidFill>
-                  <a:srgbClr val="018FF5"/>
-                </a:solidFill>
-                <a:latin typeface="Roboto Bold"/>
-              </a:rPr>
-              <a:t>Wireshark</a:t>
-            </a:r>
-            <a:r>
-              <a:rPr lang="en-US" sz="2000" spc="72" dirty="0">
-                <a:solidFill>
-                  <a:srgbClr val="F6F6F6"/>
-                </a:solidFill>
-                <a:latin typeface="Roboto"/>
-              </a:rPr>
-              <a:t>-i admin olaraq başladırıq və daha sonra </a:t>
-            </a:r>
-            <a:r>
-              <a:rPr lang="en-US" sz="2000" spc="72" dirty="0">
-                <a:solidFill>
-                  <a:srgbClr val="018FF5"/>
-                </a:solidFill>
-                <a:latin typeface="Roboto Bold"/>
-              </a:rPr>
-              <a:t>Adapter for loopback traffic capture</a:t>
-            </a:r>
-            <a:r>
-              <a:rPr lang="en-US" sz="2000" spc="72" dirty="0">
-                <a:solidFill>
-                  <a:srgbClr val="F6F6F6"/>
-                </a:solidFill>
-                <a:latin typeface="Roboto"/>
-              </a:rPr>
-              <a:t> hissəsinə daxil olduq.</a:t>
+              <a:t>2.</a:t>
+            </a:r>
+            <a:r>
+              <a:rPr lang="az-Latn-AZ" sz="2000" spc="72" dirty="0">
+                <a:solidFill>
+                  <a:srgbClr val="F6F6F6"/>
+                </a:solidFill>
+                <a:latin typeface="Roboto"/>
+              </a:rPr>
+              <a:t> Daha sonra ən aşağı hissəyə gələrək yeni sətirdən İp-mizi yazdıq daha sonra </a:t>
+            </a:r>
+            <a:r>
+              <a:rPr lang="az-Latn-AZ" sz="2000" spc="72" dirty="0">
+                <a:solidFill>
+                  <a:srgbClr val="0070C0"/>
+                </a:solidFill>
+                <a:latin typeface="Roboto"/>
+              </a:rPr>
+              <a:t>fb.com</a:t>
+            </a:r>
+            <a:r>
+              <a:rPr lang="az-Latn-AZ" sz="2000" spc="72" dirty="0">
+                <a:solidFill>
+                  <a:srgbClr val="F6F6F6"/>
+                </a:solidFill>
+                <a:latin typeface="Roboto"/>
+              </a:rPr>
+              <a:t> uzantısını verdik.</a:t>
             </a:r>
           </a:p>
           <a:p>
@@ -6328,280 +7107,196 @@
                 </a:solidFill>
                 <a:latin typeface="Roboto"/>
               </a:rPr>
-              <a:t>2.Daha sora brauzerdən </a:t>
-            </a:r>
-            <a:r>
-              <a:rPr lang="en-US" sz="2000" spc="72" dirty="0">
-                <a:solidFill>
-                  <a:srgbClr val="018FF5"/>
-                </a:solidFill>
-                <a:latin typeface="Roboto Bold"/>
-              </a:rPr>
-              <a:t>127.0.0.1</a:t>
-            </a:r>
-            <a:r>
-              <a:rPr lang="en-US" sz="2000" spc="72" dirty="0">
-                <a:solidFill>
-                  <a:srgbClr val="F6F6F6"/>
-                </a:solidFill>
-                <a:latin typeface="Roboto"/>
-              </a:rPr>
-              <a:t> səhifəsinə daxil olaraq </a:t>
-            </a:r>
-            <a:r>
-              <a:rPr lang="en-US" sz="2000" spc="72" dirty="0">
-                <a:solidFill>
-                  <a:srgbClr val="FFD230"/>
-                </a:solidFill>
-                <a:latin typeface="Roboto Bold"/>
-              </a:rPr>
-              <a:t>istifadəçi adı</a:t>
-            </a:r>
-            <a:r>
-              <a:rPr lang="en-US" sz="2000" spc="72" dirty="0">
-                <a:solidFill>
-                  <a:srgbClr val="F6F6F6"/>
-                </a:solidFill>
-                <a:latin typeface="Roboto"/>
-              </a:rPr>
-              <a:t> və </a:t>
-            </a:r>
-            <a:r>
-              <a:rPr lang="en-US" sz="2000" spc="72" dirty="0">
-                <a:solidFill>
-                  <a:srgbClr val="FFD230"/>
-                </a:solidFill>
-                <a:latin typeface="Roboto Bold"/>
-              </a:rPr>
-              <a:t>parol-</a:t>
-            </a:r>
-            <a:r>
-              <a:rPr lang="en-US" sz="2000" spc="72" dirty="0">
-                <a:solidFill>
-                  <a:srgbClr val="F6F6F6"/>
-                </a:solidFill>
-                <a:latin typeface="Roboto"/>
-              </a:rPr>
-              <a:t>u daxil etdik.</a:t>
-            </a:r>
-          </a:p>
-          <a:p>
-            <a:pPr>
-              <a:lnSpc>
-                <a:spcPts val="2400"/>
-              </a:lnSpc>
-            </a:pPr>
-            <a:r>
-              <a:rPr lang="en-US" sz="2000" spc="72" dirty="0">
-                <a:solidFill>
-                  <a:srgbClr val="F6F6F6"/>
-                </a:solidFill>
-                <a:latin typeface="Roboto"/>
-              </a:rPr>
               <a:t>3.</a:t>
             </a:r>
             <a:r>
-              <a:rPr lang="en-US" sz="2000" spc="72" dirty="0">
-                <a:solidFill>
-                  <a:srgbClr val="018FF5"/>
-                </a:solidFill>
-                <a:latin typeface="Roboto Bold"/>
-              </a:rPr>
-              <a:t>Wireshark</a:t>
-            </a:r>
-            <a:r>
-              <a:rPr lang="en-US" sz="2000" spc="72" dirty="0">
-                <a:solidFill>
-                  <a:srgbClr val="F6F6F6"/>
-                </a:solidFill>
-                <a:latin typeface="Roboto"/>
-              </a:rPr>
-              <a:t>-a geri qayıtdığımızda qarşımızda bit çox məlumat çıxdı.Ancaq bizə lazım olanı tapmaq üçün </a:t>
-            </a:r>
-            <a:r>
-              <a:rPr lang="en-US" sz="2000" spc="72" dirty="0">
-                <a:solidFill>
-                  <a:srgbClr val="018FF5"/>
-                </a:solidFill>
-                <a:latin typeface="Roboto Bold"/>
-              </a:rPr>
-              <a:t>filter</a:t>
-            </a:r>
-            <a:r>
-              <a:rPr lang="en-US" sz="2000" spc="72" dirty="0">
-                <a:solidFill>
-                  <a:srgbClr val="F6F6F6"/>
-                </a:solidFill>
-                <a:latin typeface="Roboto"/>
-              </a:rPr>
-              <a:t> hissəsinə </a:t>
-            </a:r>
-            <a:r>
-              <a:rPr lang="en-US" sz="2000" spc="72" dirty="0">
-                <a:solidFill>
-                  <a:srgbClr val="018FF5"/>
-                </a:solidFill>
-                <a:latin typeface="Roboto Bold"/>
-              </a:rPr>
-              <a:t>http</a:t>
-            </a:r>
-            <a:r>
-              <a:rPr lang="en-US" sz="2000" spc="72" dirty="0">
-                <a:solidFill>
-                  <a:srgbClr val="F6F6F6"/>
-                </a:solidFill>
-                <a:latin typeface="Roboto"/>
-              </a:rPr>
-              <a:t> yazdıq və gələn nəticələrin içindən ən sonlarda </a:t>
-            </a:r>
-            <a:r>
-              <a:rPr lang="en-US" sz="2000" spc="72" dirty="0">
-                <a:solidFill>
-                  <a:srgbClr val="018FF5"/>
-                </a:solidFill>
-                <a:latin typeface="Roboto Bold"/>
-              </a:rPr>
-              <a:t>Post</a:t>
-            </a:r>
-            <a:r>
-              <a:rPr lang="en-US" sz="2000" spc="72" dirty="0">
-                <a:solidFill>
-                  <a:srgbClr val="F6F6F6"/>
-                </a:solidFill>
-                <a:latin typeface="Roboto"/>
-              </a:rPr>
-              <a:t> olan məlumata tıklayıb sol aşağı hissədən </a:t>
-            </a:r>
-            <a:r>
-              <a:rPr lang="en-US" sz="2000" spc="72" dirty="0">
-                <a:solidFill>
-                  <a:srgbClr val="018FF5"/>
-                </a:solidFill>
-                <a:latin typeface="Roboto Bold"/>
-              </a:rPr>
-              <a:t>Html</a:t>
-            </a:r>
-            <a:r>
-              <a:rPr lang="en-US" sz="2000" spc="72" dirty="0">
-                <a:solidFill>
-                  <a:srgbClr val="F6F6F6"/>
-                </a:solidFill>
-                <a:latin typeface="Roboto"/>
-              </a:rPr>
-              <a:t> ilə başlayan hissəni genişləndirdik.</a:t>
-            </a:r>
+              <a:rPr lang="az-Latn-AZ" sz="2000" spc="72" dirty="0">
+                <a:solidFill>
+                  <a:srgbClr val="F6F6F6"/>
+                </a:solidFill>
+                <a:latin typeface="Roboto"/>
+              </a:rPr>
+              <a:t>Daha sonra </a:t>
+            </a:r>
+            <a:r>
+              <a:rPr lang="az-Latn-AZ" sz="2000" spc="72" dirty="0">
+                <a:solidFill>
+                  <a:srgbClr val="0070C0"/>
+                </a:solidFill>
+                <a:latin typeface="Roboto"/>
+              </a:rPr>
+              <a:t>save</a:t>
+            </a:r>
+            <a:r>
+              <a:rPr lang="az-Latn-AZ" sz="2000" spc="72" dirty="0">
+                <a:solidFill>
+                  <a:srgbClr val="F6F6F6"/>
+                </a:solidFill>
+                <a:latin typeface="Roboto"/>
+              </a:rPr>
+              <a:t> etdik və </a:t>
+            </a:r>
+            <a:r>
+              <a:rPr lang="az-Latn-AZ" sz="2000" spc="72" dirty="0">
+                <a:solidFill>
+                  <a:srgbClr val="0070C0"/>
+                </a:solidFill>
+                <a:latin typeface="Roboto"/>
+              </a:rPr>
+              <a:t>brauzerə</a:t>
+            </a:r>
+            <a:r>
+              <a:rPr lang="az-Latn-AZ" sz="2000" spc="72" dirty="0">
+                <a:solidFill>
+                  <a:srgbClr val="F6F6F6"/>
+                </a:solidFill>
+                <a:latin typeface="Roboto"/>
+              </a:rPr>
+              <a:t> daxil olub fb.com yazdıq.Beləcə yaratdığımız </a:t>
+            </a:r>
+            <a:r>
+              <a:rPr lang="az-Latn-AZ" sz="2000" spc="72" dirty="0">
+                <a:solidFill>
+                  <a:srgbClr val="0070C0"/>
+                </a:solidFill>
+                <a:latin typeface="Roboto"/>
+              </a:rPr>
+              <a:t>react</a:t>
+            </a:r>
+            <a:r>
+              <a:rPr lang="az-Latn-AZ" sz="2000" spc="72" dirty="0">
+                <a:solidFill>
+                  <a:srgbClr val="F6F6F6"/>
+                </a:solidFill>
+                <a:latin typeface="Roboto"/>
+              </a:rPr>
+              <a:t> ekrana çıxdı.</a:t>
+            </a:r>
+            <a:endParaRPr lang="en-US" sz="2000" spc="72" dirty="0">
+              <a:solidFill>
+                <a:srgbClr val="F6F6F6"/>
+              </a:solidFill>
+              <a:latin typeface="Roboto"/>
+            </a:endParaRPr>
           </a:p>
         </p:txBody>
       </p:sp>
       <p:pic>
         <p:nvPicPr>
-          <p:cNvPr id="5" name="Picture 5"/>
+          <p:cNvPr id="8" name="Picture 7">
+            <a:extLst>
+              <a:ext uri="{FF2B5EF4-FFF2-40B4-BE49-F238E27FC236}">
+                <a16:creationId xmlns:a16="http://schemas.microsoft.com/office/drawing/2014/main" id="{71FFDD26-D83E-4843-9650-1EFA71E992CC}"/>
+              </a:ext>
+            </a:extLst>
+          </p:cNvPr>
+          <p:cNvPicPr>
+            <a:picLocks noChangeAspect="1"/>
+          </p:cNvPicPr>
+          <p:nvPr/>
+        </p:nvPicPr>
+        <p:blipFill rotWithShape="1">
+          <a:blip r:embed="rId3">
+            <a:extLst>
+              <a:ext uri="{28A0092B-C50C-407E-A947-70E740481C1C}">
+                <a14:useLocalDpi xmlns:a14="http://schemas.microsoft.com/office/drawing/2010/main" val="0"/>
+              </a:ext>
+            </a:extLst>
+          </a:blip>
+          <a:srcRect b="25635"/>
+          <a:stretch/>
+        </p:blipFill>
+        <p:spPr>
+          <a:xfrm>
+            <a:off x="3810000" y="5676900"/>
+            <a:ext cx="9613042" cy="4021190"/>
+          </a:xfrm>
+          <a:prstGeom prst="rect">
+            <a:avLst/>
+          </a:prstGeom>
+        </p:spPr>
+      </p:pic>
+      <p:pic>
+        <p:nvPicPr>
+          <p:cNvPr id="9" name="Picture 8">
+            <a:extLst>
+              <a:ext uri="{FF2B5EF4-FFF2-40B4-BE49-F238E27FC236}">
+                <a16:creationId xmlns:a16="http://schemas.microsoft.com/office/drawing/2014/main" id="{DBEF0A35-95E3-4D86-95CB-D07C873A9B10}"/>
+              </a:ext>
+            </a:extLst>
+          </p:cNvPr>
+          <p:cNvPicPr>
+            <a:picLocks noChangeAspect="1"/>
+          </p:cNvPicPr>
+          <p:nvPr/>
+        </p:nvPicPr>
+        <p:blipFill rotWithShape="1">
+          <a:blip r:embed="rId3">
+            <a:extLst>
+              <a:ext uri="{28A0092B-C50C-407E-A947-70E740481C1C}">
+                <a14:useLocalDpi xmlns:a14="http://schemas.microsoft.com/office/drawing/2010/main" val="0"/>
+              </a:ext>
+            </a:extLst>
+          </a:blip>
+          <a:srcRect r="72601" b="91709"/>
+          <a:stretch/>
+        </p:blipFill>
+        <p:spPr>
+          <a:xfrm>
+            <a:off x="5266171" y="4039824"/>
+            <a:ext cx="6700700" cy="1140552"/>
+          </a:xfrm>
+          <a:prstGeom prst="rect">
+            <a:avLst/>
+          </a:prstGeom>
+        </p:spPr>
+      </p:pic>
+      <p:pic>
+        <p:nvPicPr>
+          <p:cNvPr id="10" name="Picture 6">
+            <a:extLst>
+              <a:ext uri="{FF2B5EF4-FFF2-40B4-BE49-F238E27FC236}">
+                <a16:creationId xmlns:a16="http://schemas.microsoft.com/office/drawing/2014/main" id="{C45CCD4C-57A8-4CBC-A2D3-D7B50EF961D3}"/>
+              </a:ext>
+            </a:extLst>
+          </p:cNvPr>
           <p:cNvPicPr>
             <a:picLocks noChangeAspect="1"/>
           </p:cNvPicPr>
           <p:nvPr/>
         </p:nvPicPr>
         <p:blipFill>
-          <a:blip r:embed="rId3"/>
+          <a:blip r:embed="rId4">
+            <a:extLst>
+              <a:ext uri="{28A0092B-C50C-407E-A947-70E740481C1C}">
+                <a14:useLocalDpi xmlns:a14="http://schemas.microsoft.com/office/drawing/2010/main" val="0"/>
+              </a:ext>
+              <a:ext uri="{96DAC541-7B7A-43D3-8B79-37D633B846F1}">
+                <asvg:svgBlip xmlns:asvg="http://schemas.microsoft.com/office/drawing/2016/SVG/main" r:embed="rId5"/>
+              </a:ext>
+            </a:extLst>
+          </a:blip>
           <a:srcRect/>
           <a:stretch>
             <a:fillRect/>
           </a:stretch>
         </p:blipFill>
         <p:spPr>
-          <a:xfrm>
-            <a:off x="3255805" y="7357654"/>
-            <a:ext cx="11776389" cy="1211915"/>
+          <a:xfrm rot="18011903">
+            <a:off x="4555767" y="5224073"/>
+            <a:ext cx="709908" cy="194337"/>
           </a:xfrm>
           <a:prstGeom prst="rect">
             <a:avLst/>
           </a:prstGeom>
         </p:spPr>
       </p:pic>
-      <p:grpSp>
-        <p:nvGrpSpPr>
-          <p:cNvPr id="6" name="Group 6"/>
-          <p:cNvGrpSpPr/>
-          <p:nvPr/>
-        </p:nvGrpSpPr>
-        <p:grpSpPr>
-          <a:xfrm>
-            <a:off x="9860703" y="7835132"/>
-            <a:ext cx="773873" cy="1100294"/>
-            <a:chOff x="0" y="0"/>
-            <a:chExt cx="1031831" cy="1467058"/>
-          </a:xfrm>
-        </p:grpSpPr>
-        <p:pic>
-          <p:nvPicPr>
-            <p:cNvPr id="7" name="Picture 7"/>
-            <p:cNvPicPr>
-              <a:picLocks noChangeAspect="1"/>
-            </p:cNvPicPr>
-            <p:nvPr/>
-          </p:nvPicPr>
-          <p:blipFill>
-            <a:blip r:embed="rId4" cstate="print">
-              <a:extLst>
-                <a:ext uri="{28A0092B-C50C-407E-A947-70E740481C1C}">
-                  <a14:useLocalDpi xmlns:a14="http://schemas.microsoft.com/office/drawing/2010/main" val="0"/>
-                </a:ext>
-                <a:ext uri="{96DAC541-7B7A-43D3-8B79-37D633B846F1}">
-                  <asvg:svgBlip xmlns:asvg="http://schemas.microsoft.com/office/drawing/2016/SVG/main" r:embed="rId5"/>
-                </a:ext>
-              </a:extLst>
-            </a:blip>
-            <a:srcRect/>
-            <a:stretch>
-              <a:fillRect/>
-            </a:stretch>
-          </p:blipFill>
-          <p:spPr>
-            <a:xfrm rot="-10800000">
-              <a:off x="0" y="0"/>
-              <a:ext cx="1031831" cy="505597"/>
-            </a:xfrm>
-            <a:prstGeom prst="rect">
-              <a:avLst/>
-            </a:prstGeom>
-          </p:spPr>
-        </p:pic>
-        <p:pic>
-          <p:nvPicPr>
-            <p:cNvPr id="8" name="Picture 8"/>
-            <p:cNvPicPr>
-              <a:picLocks noChangeAspect="1"/>
-            </p:cNvPicPr>
-            <p:nvPr/>
-          </p:nvPicPr>
-          <p:blipFill>
-            <a:blip r:embed="rId6">
-              <a:extLst>
-                <a:ext uri="{28A0092B-C50C-407E-A947-70E740481C1C}">
-                  <a14:useLocalDpi xmlns:a14="http://schemas.microsoft.com/office/drawing/2010/main" val="0"/>
-                </a:ext>
-                <a:ext uri="{96DAC541-7B7A-43D3-8B79-37D633B846F1}">
-                  <asvg:svgBlip xmlns:asvg="http://schemas.microsoft.com/office/drawing/2016/SVG/main" r:embed="rId7"/>
-                </a:ext>
-              </a:extLst>
-            </a:blip>
-            <a:srcRect/>
-            <a:stretch>
-              <a:fillRect/>
-            </a:stretch>
-          </p:blipFill>
-          <p:spPr>
-            <a:xfrm rot="-5596352">
-              <a:off x="-224397" y="806683"/>
-              <a:ext cx="1025629" cy="280766"/>
-            </a:xfrm>
-            <a:prstGeom prst="rect">
-              <a:avLst/>
-            </a:prstGeom>
-          </p:spPr>
-        </p:pic>
-      </p:grpSp>
     </p:spTree>
+    <p:extLst>
+      <p:ext uri="{BB962C8B-B14F-4D97-AF65-F5344CB8AC3E}">
+        <p14:creationId xmlns:p14="http://schemas.microsoft.com/office/powerpoint/2010/main" val="3457612916"/>
+      </p:ext>
+    </p:extLst>
   </p:cSld>
   <p:clrMapOvr>
     <a:masterClrMapping/>

</xml_diff>